<commit_message>
Small layout adjustments to slides
</commit_message>
<xml_diff>
--- a/HCIAI Assignment 5 Explainable AI for NFL.pptx
+++ b/HCIAI Assignment 5 Explainable AI for NFL.pptx
@@ -1367,9 +1367,9 @@
     <dgm:cxn modelId="{446C490C-B43F-4D92-9A2C-44FBD6DBC621}" srcId="{A846C0BE-3779-4F8E-9BEC-52DBA85104FE}" destId="{AB05E372-091A-43BA-9E71-65767C82CC56}" srcOrd="1" destOrd="0" parTransId="{6FF30DAF-7194-4CF3-AD63-DD91B04FD7D5}" sibTransId="{B06C6103-95FD-410A-AA64-774DA4F293EB}"/>
     <dgm:cxn modelId="{7BE2501D-1D25-4F58-AC6D-78EEB27E230D}" type="presOf" srcId="{8849B262-D090-4557-B44B-44D8E39975EE}" destId="{CB755511-B971-41ED-AD90-AA35D1206D4C}" srcOrd="0" destOrd="0" presId="urn:microsoft.com/office/officeart/2018/5/layout/IconCircleLabelList"/>
     <dgm:cxn modelId="{0B199328-EFD5-4109-B8DF-799EB5C89DC9}" type="presOf" srcId="{AB05E372-091A-43BA-9E71-65767C82CC56}" destId="{70419367-5722-4B7C-BA38-20163E4F2D4E}" srcOrd="0" destOrd="0" presId="urn:microsoft.com/office/officeart/2018/5/layout/IconCircleLabelList"/>
-    <dgm:cxn modelId="{CA2DAF61-89AB-49EE-B0B3-8C6D4D865B32}" srcId="{A846C0BE-3779-4F8E-9BEC-52DBA85104FE}" destId="{8849B262-D090-4557-B44B-44D8E39975EE}" srcOrd="2" destOrd="0" parTransId="{44A770C5-B0C4-4A8C-B573-F5CAAD03B7E8}" sibTransId="{E7F19940-53BB-4F6B-BF8D-D16FB9AA0E62}"/>
     <dgm:cxn modelId="{651A8044-6E8F-4533-85DC-A0D7E5B9832A}" type="presOf" srcId="{4BE9C4FC-4287-4766-A6A7-D0122D82334B}" destId="{B2CD5727-EFE3-4073-A4C4-D85EF1B0D2F8}" srcOrd="0" destOrd="0" presId="urn:microsoft.com/office/officeart/2018/5/layout/IconCircleLabelList"/>
     <dgm:cxn modelId="{E01BBE47-46F4-41B7-8A83-E509A6635077}" type="presOf" srcId="{A846C0BE-3779-4F8E-9BEC-52DBA85104FE}" destId="{9FAE5F45-FFA5-4FCE-BCF5-1268D0FBDE6A}" srcOrd="0" destOrd="0" presId="urn:microsoft.com/office/officeart/2018/5/layout/IconCircleLabelList"/>
+    <dgm:cxn modelId="{CA2DAF61-89AB-49EE-B0B3-8C6D4D865B32}" srcId="{A846C0BE-3779-4F8E-9BEC-52DBA85104FE}" destId="{8849B262-D090-4557-B44B-44D8E39975EE}" srcOrd="2" destOrd="0" parTransId="{44A770C5-B0C4-4A8C-B573-F5CAAD03B7E8}" sibTransId="{E7F19940-53BB-4F6B-BF8D-D16FB9AA0E62}"/>
     <dgm:cxn modelId="{3164DCB7-CC2D-4B2D-AA7D-0D8A430DB2B9}" srcId="{A846C0BE-3779-4F8E-9BEC-52DBA85104FE}" destId="{4BE9C4FC-4287-4766-A6A7-D0122D82334B}" srcOrd="0" destOrd="0" parTransId="{68BFA106-B840-49FE-84AA-A9CBAC33FF98}" sibTransId="{F2E880E5-4442-48BB-B032-9855C1A1A9B2}"/>
     <dgm:cxn modelId="{7B6F537C-644D-436C-BA68-E01BAACC28ED}" type="presParOf" srcId="{9FAE5F45-FFA5-4FCE-BCF5-1268D0FBDE6A}" destId="{8A298AF0-4882-4B71-B6D9-9DAE06B97B5C}" srcOrd="0" destOrd="0" presId="urn:microsoft.com/office/officeart/2018/5/layout/IconCircleLabelList"/>
     <dgm:cxn modelId="{CAF99BC4-2B18-473F-80E5-48F7054067F4}" type="presParOf" srcId="{8A298AF0-4882-4B71-B6D9-9DAE06B97B5C}" destId="{32A5D80C-212F-42C8-868F-9FE177C72B19}" srcOrd="0" destOrd="0" presId="urn:microsoft.com/office/officeart/2018/5/layout/IconCircleLabelList"/>
@@ -11163,11 +11163,11 @@
               <a:buNone/>
             </a:pPr>
             <a:r>
-              <a:rPr lang="en-US" sz="4200"/>
+              <a:rPr lang="en-US" sz="4200" dirty="0"/>
               <a:t>Explainable AI</a:t>
             </a:r>
             <a:r>
-              <a:rPr lang="en-US" sz="4200" b="0">
+              <a:rPr lang="en-US" sz="4200" b="0" dirty="0">
                 <a:latin typeface="Bookman Old Style"/>
                 <a:ea typeface="Bookman Old Style"/>
                 <a:cs typeface="Bookman Old Style"/>
@@ -11176,10 +11176,10 @@
               <a:t> for NFL </a:t>
             </a:r>
             <a:r>
-              <a:rPr lang="en-US" sz="4200"/>
+              <a:rPr lang="en-US" sz="4200" dirty="0"/>
               <a:t>game predictions</a:t>
             </a:r>
-            <a:endParaRPr lang="en-US" sz="4200" b="0">
+            <a:endParaRPr lang="en-US" sz="4200" b="0" dirty="0">
               <a:latin typeface="Bookman Old Style"/>
               <a:ea typeface="Bookman Old Style"/>
               <a:cs typeface="Bookman Old Style"/>
@@ -11895,7 +11895,11 @@
               <a:buFont typeface="Arial"/>
               <a:buNone/>
             </a:pPr>
-            <a:endParaRPr/>
+            <a:r>
+              <a:rPr lang="de-CH" dirty="0"/>
+              <a:t>Research Question</a:t>
+            </a:r>
+            <a:endParaRPr dirty="0"/>
           </a:p>
         </p:txBody>
       </p:sp>
@@ -11939,10 +11943,118 @@
               <a:buNone/>
             </a:pPr>
             <a:r>
-              <a:rPr lang="de"/>
-              <a:t>What types of visualizations are the most appropriate for explaining predictions of NFL games based on machine learning methods</a:t>
-            </a:r>
-            <a:endParaRPr/>
+              <a:rPr lang="de" dirty="0" err="1"/>
+              <a:t>What</a:t>
+            </a:r>
+            <a:r>
+              <a:rPr lang="de" dirty="0"/>
+              <a:t> </a:t>
+            </a:r>
+            <a:r>
+              <a:rPr lang="de" dirty="0" err="1"/>
+              <a:t>types</a:t>
+            </a:r>
+            <a:r>
+              <a:rPr lang="de" dirty="0"/>
+              <a:t> of </a:t>
+            </a:r>
+            <a:r>
+              <a:rPr lang="de" dirty="0" err="1"/>
+              <a:t>visualizations</a:t>
+            </a:r>
+            <a:r>
+              <a:rPr lang="de" dirty="0"/>
+              <a:t> </a:t>
+            </a:r>
+            <a:r>
+              <a:rPr lang="de" dirty="0" err="1"/>
+              <a:t>are</a:t>
+            </a:r>
+            <a:r>
+              <a:rPr lang="de" dirty="0"/>
+              <a:t> the </a:t>
+            </a:r>
+            <a:r>
+              <a:rPr lang="de" dirty="0" err="1"/>
+              <a:t>most</a:t>
+            </a:r>
+            <a:r>
+              <a:rPr lang="de" dirty="0"/>
+              <a:t> </a:t>
+            </a:r>
+            <a:r>
+              <a:rPr lang="de" dirty="0" err="1"/>
+              <a:t>appropriate</a:t>
+            </a:r>
+            <a:r>
+              <a:rPr lang="de" dirty="0"/>
+              <a:t> </a:t>
+            </a:r>
+            <a:r>
+              <a:rPr lang="de" dirty="0" err="1"/>
+              <a:t>for</a:t>
+            </a:r>
+            <a:r>
+              <a:rPr lang="de" dirty="0"/>
+              <a:t> </a:t>
+            </a:r>
+            <a:r>
+              <a:rPr lang="de" dirty="0" err="1"/>
+              <a:t>explaining</a:t>
+            </a:r>
+            <a:r>
+              <a:rPr lang="de" dirty="0"/>
+              <a:t> </a:t>
+            </a:r>
+            <a:r>
+              <a:rPr lang="de" dirty="0" err="1"/>
+              <a:t>predictions</a:t>
+            </a:r>
+            <a:r>
+              <a:rPr lang="de" dirty="0"/>
+              <a:t> of NFL </a:t>
+            </a:r>
+            <a:r>
+              <a:rPr lang="de" dirty="0" err="1"/>
+              <a:t>games</a:t>
+            </a:r>
+            <a:r>
+              <a:rPr lang="de" dirty="0"/>
+              <a:t> </a:t>
+            </a:r>
+            <a:r>
+              <a:rPr lang="de" dirty="0" err="1"/>
+              <a:t>based</a:t>
+            </a:r>
+            <a:r>
+              <a:rPr lang="de" dirty="0"/>
+              <a:t> on </a:t>
+            </a:r>
+            <a:r>
+              <a:rPr lang="de" dirty="0" err="1"/>
+              <a:t>machine</a:t>
+            </a:r>
+            <a:r>
+              <a:rPr lang="de" dirty="0"/>
+              <a:t> </a:t>
+            </a:r>
+            <a:r>
+              <a:rPr lang="de" dirty="0" err="1"/>
+              <a:t>learning</a:t>
+            </a:r>
+            <a:r>
+              <a:rPr lang="de" dirty="0"/>
+              <a:t> </a:t>
+            </a:r>
+            <a:r>
+              <a:rPr lang="de" dirty="0" err="1"/>
+              <a:t>methods</a:t>
+            </a:r>
+            <a:r>
+              <a:rPr lang="de" dirty="0"/>
+              <a:t>?</a:t>
+            </a:r>
+            <a:endParaRPr dirty="0"/>
           </a:p>
           <a:p>
             <a:pPr marL="0" lvl="0" indent="0" algn="l" rtl="0">
@@ -11954,7 +12066,7 @@
               </a:spcAft>
               <a:buNone/>
             </a:pPr>
-            <a:endParaRPr/>
+            <a:endParaRPr dirty="0"/>
           </a:p>
         </p:txBody>
       </p:sp>
@@ -13355,46 +13467,6 @@
           </a:p>
         </p:txBody>
       </p:sp>
-      <p:sp>
-        <p:nvSpPr>
-          <p:cNvPr id="193" name="Google Shape;193;p28"/>
-          <p:cNvSpPr txBox="1">
-            <a:spLocks noGrp="1"/>
-          </p:cNvSpPr>
-          <p:nvPr>
-            <p:ph type="title"/>
-          </p:nvPr>
-        </p:nvSpPr>
-        <p:spPr>
-          <a:xfrm>
-            <a:off x="484583" y="339538"/>
-            <a:ext cx="7053542" cy="1050398"/>
-          </a:xfrm>
-          <a:prstGeom prst="rect">
-            <a:avLst/>
-          </a:prstGeom>
-        </p:spPr>
-        <p:txBody>
-          <a:bodyPr spcFirstLastPara="1" vert="horz" lIns="91440" tIns="45720" rIns="91440" bIns="45720" rtlCol="0" anchor="t" anchorCtr="0">
-            <a:normAutofit/>
-          </a:bodyPr>
-          <a:lstStyle/>
-          <a:p>
-            <a:pPr marL="0" lvl="0" indent="0" defTabSz="457200">
-              <a:spcBef>
-                <a:spcPct val="0"/>
-              </a:spcBef>
-              <a:spcAft>
-                <a:spcPts val="0"/>
-              </a:spcAft>
-            </a:pPr>
-            <a:r>
-              <a:rPr lang="en-US" sz="2800" dirty="0"/>
-              <a:t>Further Research Ideas</a:t>
-            </a:r>
-          </a:p>
-        </p:txBody>
-      </p:sp>
       <p:graphicFrame>
         <p:nvGraphicFramePr>
           <p:cNvPr id="196" name="Google Shape;194;p28">
@@ -13408,13 +13480,13 @@
           <p:nvPr>
             <p:extLst>
               <p:ext uri="{D42A27DB-BD31-4B8C-83A1-F6EECF244321}">
-                <p14:modId xmlns:p14="http://schemas.microsoft.com/office/powerpoint/2010/main" val="113768191"/>
+                <p14:modId xmlns:p14="http://schemas.microsoft.com/office/powerpoint/2010/main" val="948616574"/>
               </p:ext>
             </p:extLst>
           </p:nvPr>
         </p:nvGraphicFramePr>
         <p:xfrm>
-          <a:off x="484583" y="1678021"/>
+          <a:off x="1044177" y="1538790"/>
           <a:ext cx="7053264" cy="3035030"/>
         </p:xfrm>
         <a:graphic>
@@ -13423,6 +13495,197 @@
           </a:graphicData>
         </a:graphic>
       </p:graphicFrame>
+      <p:sp>
+        <p:nvSpPr>
+          <p:cNvPr id="2" name="Google Shape;187;p27">
+            <a:extLst>
+              <a:ext uri="{FF2B5EF4-FFF2-40B4-BE49-F238E27FC236}">
+                <a16:creationId xmlns:a16="http://schemas.microsoft.com/office/drawing/2014/main" id="{7CD2C72B-4E4B-056A-78CB-A9F92D8F3F11}"/>
+              </a:ext>
+            </a:extLst>
+          </p:cNvPr>
+          <p:cNvSpPr txBox="1">
+            <a:spLocks/>
+          </p:cNvSpPr>
+          <p:nvPr/>
+        </p:nvSpPr>
+        <p:spPr>
+          <a:xfrm>
+            <a:off x="311700" y="445025"/>
+            <a:ext cx="8520600" cy="572700"/>
+          </a:xfrm>
+          <a:prstGeom prst="rect">
+            <a:avLst/>
+          </a:prstGeom>
+          <a:noFill/>
+          <a:ln>
+            <a:noFill/>
+          </a:ln>
+        </p:spPr>
+        <p:txBody>
+          <a:bodyPr spcFirstLastPara="1" vert="horz" wrap="square" lIns="91425" tIns="91425" rIns="91425" bIns="91425" rtlCol="0" anchor="t" anchorCtr="0">
+            <a:normAutofit fontScale="97500" lnSpcReduction="10000"/>
+          </a:bodyPr>
+          <a:lstStyle>
+            <a:lvl1pPr lvl="0" algn="ctr" defTabSz="342900" rtl="0" eaLnBrk="1" latinLnBrk="0" hangingPunct="1">
+              <a:lnSpc>
+                <a:spcPct val="90000"/>
+              </a:lnSpc>
+              <a:spcBef>
+                <a:spcPts val="0"/>
+              </a:spcBef>
+              <a:spcAft>
+                <a:spcPts val="0"/>
+              </a:spcAft>
+              <a:buClr>
+                <a:schemeClr val="lt1"/>
+              </a:buClr>
+              <a:buSzPts val="2800"/>
+              <a:buFont typeface="Bookman Old Style"/>
+              <a:buNone/>
+              <a:defRPr sz="3150" b="0" i="0" kern="1200">
+                <a:solidFill>
+                  <a:schemeClr val="tx2"/>
+                </a:solidFill>
+                <a:latin typeface="+mj-lt"/>
+                <a:ea typeface="+mj-ea"/>
+                <a:cs typeface="+mj-cs"/>
+              </a:defRPr>
+            </a:lvl1pPr>
+            <a:lvl2pPr lvl="1" eaLnBrk="1" hangingPunct="1">
+              <a:spcBef>
+                <a:spcPts val="0"/>
+              </a:spcBef>
+              <a:spcAft>
+                <a:spcPts val="0"/>
+              </a:spcAft>
+              <a:buSzPts val="2800"/>
+              <a:buNone/>
+              <a:defRPr>
+                <a:solidFill>
+                  <a:schemeClr val="tx2"/>
+                </a:solidFill>
+              </a:defRPr>
+            </a:lvl2pPr>
+            <a:lvl3pPr lvl="2" eaLnBrk="1" hangingPunct="1">
+              <a:spcBef>
+                <a:spcPts val="0"/>
+              </a:spcBef>
+              <a:spcAft>
+                <a:spcPts val="0"/>
+              </a:spcAft>
+              <a:buSzPts val="2800"/>
+              <a:buNone/>
+              <a:defRPr>
+                <a:solidFill>
+                  <a:schemeClr val="tx2"/>
+                </a:solidFill>
+              </a:defRPr>
+            </a:lvl3pPr>
+            <a:lvl4pPr lvl="3" eaLnBrk="1" hangingPunct="1">
+              <a:spcBef>
+                <a:spcPts val="0"/>
+              </a:spcBef>
+              <a:spcAft>
+                <a:spcPts val="0"/>
+              </a:spcAft>
+              <a:buSzPts val="2800"/>
+              <a:buNone/>
+              <a:defRPr>
+                <a:solidFill>
+                  <a:schemeClr val="tx2"/>
+                </a:solidFill>
+              </a:defRPr>
+            </a:lvl4pPr>
+            <a:lvl5pPr lvl="4" eaLnBrk="1" hangingPunct="1">
+              <a:spcBef>
+                <a:spcPts val="0"/>
+              </a:spcBef>
+              <a:spcAft>
+                <a:spcPts val="0"/>
+              </a:spcAft>
+              <a:buSzPts val="2800"/>
+              <a:buNone/>
+              <a:defRPr>
+                <a:solidFill>
+                  <a:schemeClr val="tx2"/>
+                </a:solidFill>
+              </a:defRPr>
+            </a:lvl5pPr>
+            <a:lvl6pPr lvl="5" eaLnBrk="1" hangingPunct="1">
+              <a:spcBef>
+                <a:spcPts val="0"/>
+              </a:spcBef>
+              <a:spcAft>
+                <a:spcPts val="0"/>
+              </a:spcAft>
+              <a:buSzPts val="2800"/>
+              <a:buNone/>
+              <a:defRPr>
+                <a:solidFill>
+                  <a:schemeClr val="tx2"/>
+                </a:solidFill>
+              </a:defRPr>
+            </a:lvl6pPr>
+            <a:lvl7pPr lvl="6" eaLnBrk="1" hangingPunct="1">
+              <a:spcBef>
+                <a:spcPts val="0"/>
+              </a:spcBef>
+              <a:spcAft>
+                <a:spcPts val="0"/>
+              </a:spcAft>
+              <a:buSzPts val="2800"/>
+              <a:buNone/>
+              <a:defRPr>
+                <a:solidFill>
+                  <a:schemeClr val="tx2"/>
+                </a:solidFill>
+              </a:defRPr>
+            </a:lvl7pPr>
+            <a:lvl8pPr lvl="7" eaLnBrk="1" hangingPunct="1">
+              <a:spcBef>
+                <a:spcPts val="0"/>
+              </a:spcBef>
+              <a:spcAft>
+                <a:spcPts val="0"/>
+              </a:spcAft>
+              <a:buSzPts val="2800"/>
+              <a:buNone/>
+              <a:defRPr>
+                <a:solidFill>
+                  <a:schemeClr val="tx2"/>
+                </a:solidFill>
+              </a:defRPr>
+            </a:lvl8pPr>
+            <a:lvl9pPr lvl="8" eaLnBrk="1" hangingPunct="1">
+              <a:spcBef>
+                <a:spcPts val="0"/>
+              </a:spcBef>
+              <a:spcAft>
+                <a:spcPts val="0"/>
+              </a:spcAft>
+              <a:buSzPts val="2800"/>
+              <a:buNone/>
+              <a:defRPr>
+                <a:solidFill>
+                  <a:schemeClr val="tx2"/>
+                </a:solidFill>
+              </a:defRPr>
+            </a:lvl9pPr>
+          </a:lstStyle>
+          <a:p>
+            <a:r>
+              <a:rPr lang="de-CH" dirty="0"/>
+              <a:t>Further Research </a:t>
+            </a:r>
+            <a:r>
+              <a:rPr lang="de-CH" dirty="0" err="1"/>
+              <a:t>Ideas</a:t>
+            </a:r>
+            <a:endParaRPr lang="de-CH" dirty="0"/>
+          </a:p>
+        </p:txBody>
+      </p:sp>
     </p:spTree>
   </p:cSld>
   <p:clrMapOvr>

</xml_diff>